<commit_message>
Assignment 2: removed unused part from the transcript
</commit_message>
<xml_diff>
--- a/BIT5594-Web-Based Applications & Electronic Commerce/Assignments/Assignment 2 - Cutting Edge Technology/BIT 5594 Assgn 2-Video Slides.pptx
+++ b/BIT5594-Web-Based Applications & Electronic Commerce/Assignments/Assignment 2 - Cutting Edge Technology/BIT 5594 Assgn 2-Video Slides.pptx
@@ -272,6 +272,11 @@
       </a:defRPr>
     </a:lvl9pPr>
   </p:defaultTextStyle>
+  <p:extLst>
+    <p:ext uri="{EFAFB233-063F-42B5-8137-9DF3F51BA10A}">
+      <p15:sldGuideLst xmlns:p15="http://schemas.microsoft.com/office/powerpoint/2012/main"/>
+    </p:ext>
+  </p:extLst>
 </p:presentation>
 </file>
 
@@ -1142,15 +1147,10 @@
                 <a:cs typeface="Arial"/>
                 <a:sym typeface="Arial"/>
               </a:rPr>
-              <a:t>Thank you!</a:t>
+              <a:t>Thank </a:t>
             </a:r>
-          </a:p>
-          <a:p>
-            <a:pPr marL="158750" indent="0">
-              <a:buNone/>
-            </a:pPr>
             <a:r>
-              <a:rPr lang="en-US" sz="1100" b="0" i="0" u="none" strike="noStrike" cap="none" dirty="0">
+              <a:rPr lang="en-US" sz="1100" b="0" i="0" u="none" strike="noStrike" cap="none">
                 <a:solidFill>
                   <a:srgbClr val="000000"/>
                 </a:solidFill>
@@ -1160,364 +1160,18 @@
                 <a:cs typeface="Arial"/>
                 <a:sym typeface="Arial"/>
               </a:rPr>
-              <a:t> </a:t>
+              <a:t>you!</a:t>
             </a:r>
-          </a:p>
-          <a:p>
-            <a:pPr marL="158750" indent="0">
-              <a:buNone/>
-            </a:pPr>
-            <a:r>
-              <a:rPr lang="en-US" sz="1100" b="0" i="0" u="none" strike="noStrike" cap="none" dirty="0">
-                <a:solidFill>
-                  <a:srgbClr val="000000"/>
-                </a:solidFill>
-                <a:effectLst/>
-                <a:latin typeface="Arial"/>
-                <a:ea typeface="Arial"/>
-                <a:cs typeface="Arial"/>
-                <a:sym typeface="Arial"/>
-              </a:rPr>
-              <a:t> </a:t>
-            </a:r>
-          </a:p>
-          <a:p>
-            <a:pPr marL="158750" indent="0">
-              <a:buNone/>
-            </a:pPr>
-            <a:r>
-              <a:rPr lang="en-US" sz="1100" b="0" i="0" u="none" strike="noStrike" cap="none" dirty="0">
-                <a:solidFill>
-                  <a:srgbClr val="000000"/>
-                </a:solidFill>
-                <a:effectLst/>
-                <a:latin typeface="Arial"/>
-                <a:ea typeface="Arial"/>
-                <a:cs typeface="Arial"/>
-                <a:sym typeface="Arial"/>
-              </a:rPr>
-              <a:t> </a:t>
-            </a:r>
-          </a:p>
-          <a:p>
-            <a:pPr marL="158750" indent="0">
-              <a:buNone/>
-            </a:pPr>
-            <a:r>
-              <a:rPr lang="en-US" sz="1100" b="0" i="0" u="none" strike="noStrike" cap="none" dirty="0">
-                <a:solidFill>
-                  <a:srgbClr val="000000"/>
-                </a:solidFill>
-                <a:effectLst/>
-                <a:latin typeface="Arial"/>
-                <a:ea typeface="Arial"/>
-                <a:cs typeface="Arial"/>
-                <a:sym typeface="Arial"/>
-              </a:rPr>
-              <a:t> </a:t>
-            </a:r>
-          </a:p>
-          <a:p>
-            <a:pPr marL="158750" indent="0">
-              <a:buNone/>
-            </a:pPr>
-            <a:r>
-              <a:rPr lang="en-US" sz="1100" b="0" i="0" u="none" strike="noStrike" cap="none" dirty="0">
-                <a:solidFill>
-                  <a:srgbClr val="000000"/>
-                </a:solidFill>
-                <a:effectLst/>
-                <a:latin typeface="Arial"/>
-                <a:ea typeface="Arial"/>
-                <a:cs typeface="Arial"/>
-                <a:sym typeface="Arial"/>
-              </a:rPr>
-              <a:t> </a:t>
-            </a:r>
-          </a:p>
-          <a:p>
-            <a:pPr marL="158750" indent="0">
-              <a:buNone/>
-            </a:pPr>
-            <a:r>
-              <a:rPr lang="en-US" sz="1100" b="0" i="0" u="none" strike="noStrike" cap="none" dirty="0">
-                <a:solidFill>
-                  <a:srgbClr val="000000"/>
-                </a:solidFill>
-                <a:effectLst/>
-                <a:latin typeface="Arial"/>
-                <a:ea typeface="Arial"/>
-                <a:cs typeface="Arial"/>
-                <a:sym typeface="Arial"/>
-              </a:rPr>
-              <a:t> </a:t>
-            </a:r>
-          </a:p>
-          <a:p>
-            <a:pPr marL="158750" indent="0">
-              <a:buNone/>
-            </a:pPr>
-            <a:r>
-              <a:rPr lang="en-US" sz="1100" b="0" i="0" u="none" strike="noStrike" cap="none" dirty="0">
-                <a:solidFill>
-                  <a:srgbClr val="000000"/>
-                </a:solidFill>
-                <a:effectLst/>
-                <a:latin typeface="Arial"/>
-                <a:ea typeface="Arial"/>
-                <a:cs typeface="Arial"/>
-                <a:sym typeface="Arial"/>
-              </a:rPr>
-              <a:t> </a:t>
-            </a:r>
-          </a:p>
-          <a:p>
-            <a:pPr marL="158750" indent="0">
-              <a:buNone/>
-            </a:pPr>
-            <a:r>
-              <a:rPr lang="en-US" sz="1100" b="0" i="0" u="none" strike="noStrike" cap="none" dirty="0">
-                <a:solidFill>
-                  <a:srgbClr val="000000"/>
-                </a:solidFill>
-                <a:effectLst/>
-                <a:latin typeface="Arial"/>
-                <a:ea typeface="Arial"/>
-                <a:cs typeface="Arial"/>
-                <a:sym typeface="Arial"/>
-              </a:rPr>
-              <a:t> </a:t>
-            </a:r>
-          </a:p>
-          <a:p>
-            <a:pPr marL="158750" indent="0">
-              <a:buNone/>
-            </a:pPr>
-            <a:r>
-              <a:rPr lang="en-US" sz="1100" b="0" i="0" u="none" strike="noStrike" cap="none" dirty="0">
-                <a:solidFill>
-                  <a:srgbClr val="000000"/>
-                </a:solidFill>
-                <a:effectLst/>
-                <a:latin typeface="Arial"/>
-                <a:ea typeface="Arial"/>
-                <a:cs typeface="Arial"/>
-                <a:sym typeface="Arial"/>
-              </a:rPr>
-              <a:t> </a:t>
-            </a:r>
-          </a:p>
-          <a:p>
-            <a:pPr marL="158750" indent="0">
-              <a:buNone/>
-            </a:pPr>
-            <a:r>
-              <a:rPr lang="en-US" sz="1100" b="0" i="0" u="none" strike="noStrike" cap="none" dirty="0">
-                <a:solidFill>
-                  <a:srgbClr val="000000"/>
-                </a:solidFill>
-                <a:effectLst/>
-                <a:latin typeface="Arial"/>
-                <a:ea typeface="Arial"/>
-                <a:cs typeface="Arial"/>
-                <a:sym typeface="Arial"/>
-              </a:rPr>
-              <a:t> </a:t>
-            </a:r>
-          </a:p>
-          <a:p>
-            <a:pPr marL="158750" indent="0">
-              <a:buNone/>
-            </a:pPr>
-            <a:r>
-              <a:rPr lang="en-US" sz="1100" b="0" i="0" u="none" strike="noStrike" cap="none" dirty="0">
-                <a:solidFill>
-                  <a:srgbClr val="000000"/>
-                </a:solidFill>
-                <a:effectLst/>
-                <a:latin typeface="Arial"/>
-                <a:ea typeface="Arial"/>
-                <a:cs typeface="Arial"/>
-                <a:sym typeface="Arial"/>
-              </a:rPr>
-              <a:t>[pause] so when you go to </a:t>
-            </a:r>
-            <a:r>
-              <a:rPr lang="en-US" sz="1100" b="0" i="0" u="none" strike="noStrike" cap="none" dirty="0" err="1">
-                <a:solidFill>
-                  <a:srgbClr val="000000"/>
-                </a:solidFill>
-                <a:effectLst/>
-                <a:latin typeface="Arial"/>
-                <a:ea typeface="Arial"/>
-                <a:cs typeface="Arial"/>
-                <a:sym typeface="Arial"/>
-              </a:rPr>
-              <a:t>instagram</a:t>
-            </a:r>
-            <a:r>
-              <a:rPr lang="en-US" sz="1100" b="0" i="0" u="none" strike="noStrike" cap="none" dirty="0">
-                <a:solidFill>
-                  <a:srgbClr val="000000"/>
-                </a:solidFill>
-                <a:effectLst/>
-                <a:latin typeface="Arial"/>
-                <a:ea typeface="Arial"/>
-                <a:cs typeface="Arial"/>
-                <a:sym typeface="Arial"/>
-              </a:rPr>
-              <a:t> or </a:t>
-            </a:r>
-            <a:r>
-              <a:rPr lang="en-US" sz="1100" b="0" i="0" u="none" strike="noStrike" cap="none" dirty="0" err="1">
-                <a:solidFill>
-                  <a:srgbClr val="000000"/>
-                </a:solidFill>
-                <a:effectLst/>
-                <a:latin typeface="Arial"/>
-                <a:ea typeface="Arial"/>
-                <a:cs typeface="Arial"/>
-                <a:sym typeface="Arial"/>
-              </a:rPr>
-              <a:t>walmart.com</a:t>
-            </a:r>
-            <a:r>
-              <a:rPr lang="en-US" sz="1100" b="0" i="0" u="none" strike="noStrike" cap="none" dirty="0">
-                <a:solidFill>
-                  <a:srgbClr val="000000"/>
-                </a:solidFill>
-                <a:effectLst/>
-                <a:latin typeface="Arial"/>
-                <a:ea typeface="Arial"/>
-                <a:cs typeface="Arial"/>
-                <a:sym typeface="Arial"/>
-              </a:rPr>
-              <a:t> or </a:t>
-            </a:r>
-            <a:r>
-              <a:rPr lang="en-US" sz="1100" b="0" i="0" u="none" strike="noStrike" cap="none" dirty="0" err="1">
-                <a:solidFill>
-                  <a:srgbClr val="000000"/>
-                </a:solidFill>
-                <a:effectLst/>
-                <a:latin typeface="Arial"/>
-                <a:ea typeface="Arial"/>
-                <a:cs typeface="Arial"/>
-                <a:sym typeface="Arial"/>
-              </a:rPr>
-              <a:t>facebook</a:t>
-            </a:r>
-            <a:r>
-              <a:rPr lang="en-US" sz="1100" b="0" i="0" u="none" strike="noStrike" cap="none" dirty="0">
-                <a:solidFill>
-                  <a:srgbClr val="000000"/>
-                </a:solidFill>
-                <a:effectLst/>
-                <a:latin typeface="Arial"/>
-                <a:ea typeface="Arial"/>
-                <a:cs typeface="Arial"/>
-                <a:sym typeface="Arial"/>
-              </a:rPr>
-              <a:t> [pause] and</a:t>
-            </a:r>
-          </a:p>
-          <a:p>
-            <a:pPr marL="158750" indent="0">
-              <a:buNone/>
-            </a:pPr>
-            <a:r>
-              <a:rPr lang="en-US" sz="1100" b="0" i="0" u="none" strike="noStrike" cap="none" dirty="0">
-                <a:solidFill>
-                  <a:srgbClr val="000000"/>
-                </a:solidFill>
-                <a:effectLst/>
-                <a:latin typeface="Arial"/>
-                <a:ea typeface="Arial"/>
-                <a:cs typeface="Arial"/>
-                <a:sym typeface="Arial"/>
-              </a:rPr>
-              <a:t>and you're interacting with those apps [pause] that is [pause] the </a:t>
-            </a:r>
-            <a:r>
-              <a:rPr lang="en-US" sz="1100" b="0" i="0" u="none" strike="noStrike" cap="none" dirty="0" err="1">
-                <a:solidFill>
-                  <a:srgbClr val="000000"/>
-                </a:solidFill>
-                <a:effectLst/>
-                <a:latin typeface="Arial"/>
-                <a:ea typeface="Arial"/>
-                <a:cs typeface="Arial"/>
-                <a:sym typeface="Arial"/>
-              </a:rPr>
-              <a:t>reactJS</a:t>
-            </a:r>
-            <a:r>
-              <a:rPr lang="en-US" sz="1100" b="0" i="0" u="none" strike="noStrike" cap="none" dirty="0">
-                <a:solidFill>
-                  <a:srgbClr val="000000"/>
-                </a:solidFill>
-                <a:effectLst/>
-                <a:latin typeface="Arial"/>
-                <a:ea typeface="Arial"/>
-                <a:cs typeface="Arial"/>
-                <a:sym typeface="Arial"/>
-              </a:rPr>
-              <a:t> side</a:t>
-            </a:r>
-          </a:p>
-          <a:p>
-            <a:pPr marL="158750" indent="0">
-              <a:buNone/>
-            </a:pPr>
-            <a:r>
-              <a:rPr lang="en-US" sz="1100" b="0" i="0" u="none" strike="noStrike" cap="none" dirty="0">
-                <a:solidFill>
-                  <a:srgbClr val="000000"/>
-                </a:solidFill>
-                <a:effectLst/>
-                <a:latin typeface="Arial"/>
-                <a:ea typeface="Arial"/>
-                <a:cs typeface="Arial"/>
-                <a:sym typeface="Arial"/>
-              </a:rPr>
-              <a:t>of things [pause] that you're interacting with</a:t>
-            </a:r>
-          </a:p>
-          <a:p>
-            <a:pPr marL="158750" indent="0">
-              <a:buNone/>
-            </a:pPr>
-            <a:r>
-              <a:rPr lang="en-US" sz="1100" b="0" i="0" u="none" strike="noStrike" cap="none" dirty="0">
-                <a:solidFill>
-                  <a:srgbClr val="000000"/>
-                </a:solidFill>
-                <a:effectLst/>
-                <a:latin typeface="Arial"/>
-                <a:ea typeface="Arial"/>
-                <a:cs typeface="Arial"/>
-                <a:sym typeface="Arial"/>
-              </a:rPr>
-              <a:t> </a:t>
-            </a:r>
-          </a:p>
-          <a:p>
-            <a:pPr marL="158750" indent="0">
-              <a:buNone/>
-            </a:pPr>
-            <a:r>
-              <a:rPr lang="en-US" sz="1100" b="0" i="0" u="none" strike="noStrike" cap="none" dirty="0">
-                <a:solidFill>
-                  <a:srgbClr val="000000"/>
-                </a:solidFill>
-                <a:effectLst/>
-                <a:latin typeface="Arial"/>
-                <a:ea typeface="Arial"/>
-                <a:cs typeface="Arial"/>
-                <a:sym typeface="Arial"/>
-              </a:rPr>
-              <a:t> </a:t>
-            </a:r>
+            <a:endParaRPr lang="en-US" sz="1100" b="0" i="0" u="none" strike="noStrike" cap="none" dirty="0">
+              <a:solidFill>
+                <a:srgbClr val="000000"/>
+              </a:solidFill>
+              <a:effectLst/>
+              <a:latin typeface="Arial"/>
+              <a:ea typeface="Arial"/>
+              <a:cs typeface="Arial"/>
+              <a:sym typeface="Arial"/>
+            </a:endParaRPr>
           </a:p>
         </p:txBody>
       </p:sp>
@@ -17815,11 +17469,11 @@
   <p:clrMapOvr>
     <a:masterClrMapping/>
   </p:clrMapOvr>
-  <mc:AlternateContent xmlns:mc="http://schemas.openxmlformats.org/markup-compatibility/2006">
-    <mc:Choice xmlns:p14="http://schemas.microsoft.com/office/powerpoint/2010/main" Requires="p14">
+  <mc:AlternateContent xmlns:mc="http://schemas.openxmlformats.org/markup-compatibility/2006" xmlns:p14="http://schemas.microsoft.com/office/powerpoint/2010/main">
+    <mc:Choice Requires="p14">
       <p:transition spd="slow" p14:dur="2000" advTm="23402"/>
     </mc:Choice>
-    <mc:Fallback>
+    <mc:Fallback xmlns="">
       <p:transition spd="slow" advTm="23402"/>
     </mc:Fallback>
   </mc:AlternateContent>
@@ -20260,11 +19914,11 @@
   <p:clrMapOvr>
     <a:masterClrMapping/>
   </p:clrMapOvr>
-  <mc:AlternateContent xmlns:mc="http://schemas.openxmlformats.org/markup-compatibility/2006">
-    <mc:Choice xmlns:p14="http://schemas.microsoft.com/office/powerpoint/2010/main" Requires="p14">
+  <mc:AlternateContent xmlns:mc="http://schemas.openxmlformats.org/markup-compatibility/2006" xmlns:p14="http://schemas.microsoft.com/office/powerpoint/2010/main">
+    <mc:Choice Requires="p14">
       <p:transition spd="slow" p14:dur="2000" advTm="34799"/>
     </mc:Choice>
-    <mc:Fallback>
+    <mc:Fallback xmlns="">
       <p:transition spd="slow" advTm="34799"/>
     </mc:Fallback>
   </mc:AlternateContent>

</xml_diff>